<commit_message>
Added examples and presentation to W2, S3
</commit_message>
<xml_diff>
--- a/week-2/W2-S3-FlexBox/W2-S3-FlexBox.pptx
+++ b/week-2/W2-S3-FlexBox/W2-S3-FlexBox.pptx
@@ -5,10 +5,10 @@
     <p:sldMasterId id="2147483968" r:id="rId1"/>
   </p:sldMasterIdLst>
   <p:notesMasterIdLst>
-    <p:notesMasterId r:id="rId20"/>
+    <p:notesMasterId r:id="rId22"/>
   </p:notesMasterIdLst>
   <p:handoutMasterIdLst>
-    <p:handoutMasterId r:id="rId21"/>
+    <p:handoutMasterId r:id="rId23"/>
   </p:handoutMasterIdLst>
   <p:sldIdLst>
     <p:sldId id="256" r:id="rId2"/>
@@ -25,10 +25,12 @@
     <p:sldId id="271" r:id="rId13"/>
     <p:sldId id="272" r:id="rId14"/>
     <p:sldId id="273" r:id="rId15"/>
-    <p:sldId id="286" r:id="rId16"/>
-    <p:sldId id="292" r:id="rId17"/>
-    <p:sldId id="293" r:id="rId18"/>
-    <p:sldId id="264" r:id="rId19"/>
+    <p:sldId id="294" r:id="rId16"/>
+    <p:sldId id="295" r:id="rId17"/>
+    <p:sldId id="286" r:id="rId18"/>
+    <p:sldId id="292" r:id="rId19"/>
+    <p:sldId id="293" r:id="rId20"/>
+    <p:sldId id="264" r:id="rId21"/>
   </p:sldIdLst>
   <p:sldSz cx="12192000" cy="6858000"/>
   <p:notesSz cx="6858000" cy="9144000"/>
@@ -146,6 +148,8 @@
             <p14:sldId id="271"/>
             <p14:sldId id="272"/>
             <p14:sldId id="273"/>
+            <p14:sldId id="294"/>
+            <p14:sldId id="295"/>
             <p14:sldId id="286"/>
             <p14:sldId id="292"/>
             <p14:sldId id="293"/>
@@ -461,7 +465,7 @@
           <a:p>
             <a:fld id="{AA884A5F-B9F5-9B43-BE5B-EBBCD5646595}" type="datetimeFigureOut">
               <a:rPr lang="en-US" smtClean="0"/>
-              <a:t>9/21/24</a:t>
+              <a:t>9/22/24</a:t>
             </a:fld>
             <a:endParaRPr lang="en-US"/>
           </a:p>
@@ -1058,7 +1062,7 @@
           <a:p>
             <a:fld id="{F6FA2B21-3FCD-4721-B95C-427943F61125}" type="datetime1">
               <a:rPr lang="en-US" smtClean="0"/>
-              <a:t>9/21/24</a:t>
+              <a:t>9/22/24</a:t>
             </a:fld>
             <a:endParaRPr lang="en-US"/>
           </a:p>
@@ -1321,7 +1325,7 @@
           <a:p>
             <a:fld id="{F6FA2B21-3FCD-4721-B95C-427943F61125}" type="datetime1">
               <a:rPr lang="en-US" smtClean="0"/>
-              <a:t>9/21/24</a:t>
+              <a:t>9/22/24</a:t>
             </a:fld>
             <a:endParaRPr lang="en-US"/>
           </a:p>
@@ -1557,7 +1561,7 @@
           <a:p>
             <a:fld id="{F6FA2B21-3FCD-4721-B95C-427943F61125}" type="datetime1">
               <a:rPr lang="en-US" smtClean="0"/>
-              <a:t>9/21/24</a:t>
+              <a:t>9/22/24</a:t>
             </a:fld>
             <a:endParaRPr lang="en-US"/>
           </a:p>
@@ -1885,7 +1889,7 @@
           <a:p>
             <a:fld id="{EA0C0817-A112-4847-8014-A94B7D2A4EA3}" type="datetime1">
               <a:rPr lang="en-US" smtClean="0"/>
-              <a:t>9/21/24</a:t>
+              <a:t>9/22/24</a:t>
             </a:fld>
             <a:endParaRPr lang="en-US" dirty="0"/>
           </a:p>
@@ -2199,7 +2203,7 @@
           <a:p>
             <a:fld id="{7332B432-ACDA-4023-A761-2BAB76577B62}" type="datetime1">
               <a:rPr lang="en-US" smtClean="0"/>
-              <a:t>9/21/24</a:t>
+              <a:t>9/22/24</a:t>
             </a:fld>
             <a:endParaRPr lang="en-US"/>
           </a:p>
@@ -2506,7 +2510,7 @@
           <a:p>
             <a:fld id="{D9C646AA-F36E-4540-911D-FFFC0A0EF24A}" type="datetime1">
               <a:rPr lang="en-US" smtClean="0"/>
-              <a:t>9/21/24</a:t>
+              <a:t>9/22/24</a:t>
             </a:fld>
             <a:endParaRPr lang="en-US" dirty="0"/>
           </a:p>
@@ -2808,7 +2812,7 @@
           <a:p>
             <a:fld id="{69186D26-FA5F-4637-B602-B7C2DC34CFD4}" type="datetime1">
               <a:rPr lang="en-US" smtClean="0"/>
-              <a:t>9/21/24</a:t>
+              <a:t>9/22/24</a:t>
             </a:fld>
             <a:endParaRPr lang="en-US"/>
           </a:p>
@@ -3230,7 +3234,7 @@
           <a:p>
             <a:fld id="{8A7F15D8-96D1-4781-BC50-CA8A088B2FE4}" type="datetime1">
               <a:rPr lang="en-US" smtClean="0"/>
-              <a:t>9/21/24</a:t>
+              <a:t>9/22/24</a:t>
             </a:fld>
             <a:endParaRPr lang="en-US"/>
           </a:p>
@@ -3392,7 +3396,7 @@
           <a:p>
             <a:fld id="{F9A96C99-B8F8-4528-BD05-0E16E943DC09}" type="datetime1">
               <a:rPr lang="en-US" smtClean="0"/>
-              <a:t>9/21/24</a:t>
+              <a:t>9/22/24</a:t>
             </a:fld>
             <a:endParaRPr lang="en-US"/>
           </a:p>
@@ -3487,7 +3491,7 @@
           <a:p>
             <a:fld id="{03636942-C211-4B28-8DBD-C953E00AF71B}" type="datetime1">
               <a:rPr lang="en-US" smtClean="0"/>
-              <a:t>9/21/24</a:t>
+              <a:t>9/22/24</a:t>
             </a:fld>
             <a:endParaRPr lang="en-US"/>
           </a:p>
@@ -3865,7 +3869,7 @@
           <a:p>
             <a:fld id="{7E8D12A6-918A-48BD-8CB9-CA713993B0EA}" type="datetime1">
               <a:rPr lang="en-US" smtClean="0"/>
-              <a:t>9/21/24</a:t>
+              <a:t>9/22/24</a:t>
             </a:fld>
             <a:endParaRPr lang="en-US"/>
           </a:p>
@@ -4154,7 +4158,7 @@
           <a:p>
             <a:fld id="{F6FA2B21-3FCD-4721-B95C-427943F61125}" type="datetime1">
               <a:rPr lang="en-US" smtClean="0"/>
-              <a:t>9/21/24</a:t>
+              <a:t>9/22/24</a:t>
             </a:fld>
             <a:endParaRPr lang="en-US"/>
           </a:p>
@@ -4366,7 +4370,7 @@
           <a:p>
             <a:fld id="{F6FA2B21-3FCD-4721-B95C-427943F61125}" type="datetime1">
               <a:rPr lang="en-US" smtClean="0"/>
-              <a:t>9/21/24</a:t>
+              <a:t>9/22/24</a:t>
             </a:fld>
             <a:endParaRPr lang="en-US"/>
           </a:p>
@@ -5070,7 +5074,7 @@
                   <a:schemeClr val="tx1"/>
                 </a:solidFill>
               </a:rPr>
-              <a:t>Introduction to CSS Box Model, Borders, and Variables</a:t>
+              <a:t>Flexbox and Git Collaboration</a:t>
             </a:r>
             <a:endParaRPr lang="en-US" sz="4000" dirty="0">
               <a:solidFill>
@@ -5186,7 +5190,7 @@
           <a:p>
             <a:r>
               <a:rPr lang="en-GB" dirty="0"/>
-              <a:t>Box-Shadow Example</a:t>
+              <a:t>align-items</a:t>
             </a:r>
           </a:p>
         </p:txBody>
@@ -5219,38 +5223,65 @@
           </a:bodyPr>
           <a:lstStyle/>
           <a:p>
-            <a:endParaRPr lang="en-GB" b="1" dirty="0"/>
-          </a:p>
-          <a:p>
-            <a:endParaRPr lang="en-GB" b="1" dirty="0"/>
-          </a:p>
-          <a:p>
-            <a:endParaRPr lang="en-GB" b="1" dirty="0"/>
-          </a:p>
-          <a:p>
-            <a:endParaRPr lang="en-GB" b="1" dirty="0"/>
-          </a:p>
-          <a:p>
-            <a:endParaRPr lang="en-GB" b="1" dirty="0"/>
-          </a:p>
-          <a:p>
             <a:r>
               <a:rPr lang="en-GB" b="1" dirty="0"/>
-              <a:t>Result</a:t>
-            </a:r>
-            <a:r>
-              <a:rPr lang="en-GB" dirty="0"/>
-              <a:t>: A grey box with a shadow that offsets by 10px on both axes, with a 20px blur.</a:t>
+              <a:t>align-items</a:t>
+            </a:r>
+            <a:r>
+              <a:rPr lang="en-GB" dirty="0"/>
+              <a:t> aligns items along the cross axis (perpendicular to the main axis).</a:t>
+            </a:r>
+          </a:p>
+          <a:p>
+            <a:pPr>
+              <a:buFont typeface="Arial" panose="020B0604020202020204" pitchFamily="34" charset="0"/>
+              <a:buChar char="•"/>
+            </a:pPr>
+            <a:r>
+              <a:rPr lang="en-GB" dirty="0"/>
+              <a:t>flex-start: Align items to the top.</a:t>
+            </a:r>
+          </a:p>
+          <a:p>
+            <a:pPr>
+              <a:buFont typeface="Arial" panose="020B0604020202020204" pitchFamily="34" charset="0"/>
+              <a:buChar char="•"/>
+            </a:pPr>
+            <a:r>
+              <a:rPr lang="en-GB" dirty="0" err="1"/>
+              <a:t>center</a:t>
+            </a:r>
+            <a:r>
+              <a:rPr lang="en-GB" dirty="0"/>
+              <a:t>: </a:t>
+            </a:r>
+            <a:r>
+              <a:rPr lang="en-GB" dirty="0" err="1"/>
+              <a:t>Center</a:t>
+            </a:r>
+            <a:r>
+              <a:rPr lang="en-GB" dirty="0"/>
+              <a:t> items vertically.</a:t>
+            </a:r>
+          </a:p>
+          <a:p>
+            <a:pPr>
+              <a:buFont typeface="Arial" panose="020B0604020202020204" pitchFamily="34" charset="0"/>
+              <a:buChar char="•"/>
+            </a:pPr>
+            <a:r>
+              <a:rPr lang="en-GB" dirty="0"/>
+              <a:t>stretch: Items stretch to fill container.</a:t>
             </a:r>
           </a:p>
         </p:txBody>
       </p:sp>
       <p:pic>
         <p:nvPicPr>
-          <p:cNvPr id="11" name="Picture 10" descr="A black screen with white text&#10;&#10;Description automatically generated">
+          <p:cNvPr id="5" name="Picture 4" descr="A screen shot of a computer code&#10;&#10;Description automatically generated">
             <a:extLst>
               <a:ext uri="{FF2B5EF4-FFF2-40B4-BE49-F238E27FC236}">
-                <a16:creationId xmlns:a16="http://schemas.microsoft.com/office/drawing/2014/main" id="{40E9FC06-F0E3-4B55-EF71-7DC00DC3BF86}"/>
+                <a16:creationId xmlns:a16="http://schemas.microsoft.com/office/drawing/2014/main" id="{5288E7B1-F676-2FA9-AFB6-731A9E9ED6B3}"/>
               </a:ext>
             </a:extLst>
           </p:cNvPr>
@@ -5267,8 +5298,8 @@
         </p:blipFill>
         <p:spPr>
           <a:xfrm>
-            <a:off x="860647" y="2438400"/>
-            <a:ext cx="5537200" cy="1981200"/>
+            <a:off x="6095999" y="2804258"/>
+            <a:ext cx="4971493" cy="2529742"/>
           </a:xfrm>
           <a:prstGeom prst="rect">
             <a:avLst/>
@@ -5341,7 +5372,7 @@
           <a:p>
             <a:r>
               <a:rPr lang="en-GB" dirty="0"/>
-              <a:t>CSS Variables (Custom Properties)</a:t>
+              <a:t>The Flex Axis</a:t>
             </a:r>
           </a:p>
         </p:txBody>
@@ -5380,11 +5411,11 @@
             </a:pPr>
             <a:r>
               <a:rPr lang="en-GB" b="1" dirty="0"/>
-              <a:t>CSS Variables</a:t>
-            </a:r>
-            <a:r>
-              <a:rPr lang="en-GB" dirty="0"/>
-              <a:t> allow you to store values in variables for reuse throughout your stylesheet.</a:t>
+              <a:t>Main Axis</a:t>
+            </a:r>
+            <a:r>
+              <a:rPr lang="en-GB" dirty="0"/>
+              <a:t>: Defined by flex-direction. Horizontal if row, vertical if column.</a:t>
             </a:r>
           </a:p>
           <a:p>
@@ -5394,73 +5425,35 @@
             </a:pPr>
             <a:r>
               <a:rPr lang="en-GB" b="1" dirty="0"/>
-              <a:t>Benefits</a:t>
-            </a:r>
-            <a:r>
-              <a:rPr lang="en-GB" dirty="0"/>
-              <a:t>: </a:t>
-            </a:r>
-          </a:p>
-          <a:p>
-            <a:pPr>
-              <a:buFont typeface="Arial" panose="020B0604020202020204" pitchFamily="34" charset="0"/>
-              <a:buChar char="•"/>
-            </a:pPr>
-            <a:r>
-              <a:rPr lang="en-GB" dirty="0"/>
-              <a:t>Centralized management of values (</a:t>
-            </a:r>
-            <a:r>
-              <a:rPr lang="en-GB" dirty="0" err="1"/>
-              <a:t>colors</a:t>
-            </a:r>
-            <a:r>
-              <a:rPr lang="en-GB" dirty="0"/>
-              <a:t>, spacing, etc.).</a:t>
-            </a:r>
-          </a:p>
-          <a:p>
-            <a:pPr>
-              <a:buFont typeface="Arial" panose="020B0604020202020204" pitchFamily="34" charset="0"/>
-              <a:buChar char="•"/>
-            </a:pPr>
-            <a:r>
-              <a:rPr lang="en-GB" dirty="0"/>
-              <a:t>Easier to implement changes across large stylesheets.</a:t>
-            </a:r>
-          </a:p>
-        </p:txBody>
-      </p:sp>
-      <p:pic>
-        <p:nvPicPr>
-          <p:cNvPr id="5" name="Picture 4" descr="A black screen with colorful text&#10;&#10;Description automatically generated">
-            <a:extLst>
-              <a:ext uri="{FF2B5EF4-FFF2-40B4-BE49-F238E27FC236}">
-                <a16:creationId xmlns:a16="http://schemas.microsoft.com/office/drawing/2014/main" id="{DF245950-E68F-5139-0C84-B802EE913050}"/>
-              </a:ext>
-            </a:extLst>
-          </p:cNvPr>
-          <p:cNvPicPr>
-            <a:picLocks noChangeAspect="1"/>
-          </p:cNvPicPr>
-          <p:nvPr/>
-        </p:nvPicPr>
-        <p:blipFill>
-          <a:blip r:embed="rId2"/>
-          <a:stretch>
-            <a:fillRect/>
-          </a:stretch>
-        </p:blipFill>
-        <p:spPr>
-          <a:xfrm>
-            <a:off x="6262847" y="3028526"/>
-            <a:ext cx="4800600" cy="2032000"/>
-          </a:xfrm>
-          <a:prstGeom prst="rect">
-            <a:avLst/>
-          </a:prstGeom>
-        </p:spPr>
-      </p:pic>
+              <a:t>Cross Axis</a:t>
+            </a:r>
+            <a:r>
+              <a:rPr lang="en-GB" dirty="0"/>
+              <a:t>: Perpendicular to the main axis.</a:t>
+            </a:r>
+          </a:p>
+          <a:p>
+            <a:r>
+              <a:rPr lang="en-GB" b="1" dirty="0"/>
+              <a:t>Tip</a:t>
+            </a:r>
+            <a:r>
+              <a:rPr lang="en-GB" dirty="0"/>
+              <a:t>: Understanding the axes helps you control alignment using justify-content (main axis) and align-items (cross axis).</a:t>
+            </a:r>
+            <a:br>
+              <a:rPr lang="en-GB" dirty="0"/>
+            </a:br>
+            <a:br>
+              <a:rPr lang="en-GB" dirty="0"/>
+            </a:br>
+            <a:r>
+              <a:rPr lang="en-GB" dirty="0"/>
+              <a:t>Demo…</a:t>
+            </a:r>
+          </a:p>
+        </p:txBody>
+      </p:sp>
     </p:spTree>
     <p:extLst>
       <p:ext uri="{BB962C8B-B14F-4D97-AF65-F5344CB8AC3E}">
@@ -5527,7 +5520,7 @@
           <a:p>
             <a:r>
               <a:rPr lang="en-GB" dirty="0"/>
-              <a:t>Using CSS Variables</a:t>
+              <a:t>Git Collaboration</a:t>
             </a:r>
           </a:p>
         </p:txBody>
@@ -5566,7 +5559,7 @@
             </a:pPr>
             <a:r>
               <a:rPr lang="en-GB" dirty="0"/>
-              <a:t>Variables are defined in the :root selector (global scope).</a:t>
+              <a:t>Git enables team collaboration by allowing multiple people to work on the same project. </a:t>
             </a:r>
           </a:p>
           <a:p>
@@ -5576,41 +5569,11 @@
             </a:pPr>
             <a:r>
               <a:rPr lang="en-GB" dirty="0"/>
-              <a:t>Accessed using var(--variable-name).</a:t>
-            </a:r>
-          </a:p>
-        </p:txBody>
-      </p:sp>
-      <p:pic>
-        <p:nvPicPr>
-          <p:cNvPr id="5" name="Picture 4" descr="A computer code on a black background&#10;&#10;Description automatically generated">
-            <a:extLst>
-              <a:ext uri="{FF2B5EF4-FFF2-40B4-BE49-F238E27FC236}">
-                <a16:creationId xmlns:a16="http://schemas.microsoft.com/office/drawing/2014/main" id="{72AD9E57-F3B3-F9A2-D950-613510659056}"/>
-              </a:ext>
-            </a:extLst>
-          </p:cNvPr>
-          <p:cNvPicPr>
-            <a:picLocks noChangeAspect="1"/>
-          </p:cNvPicPr>
-          <p:nvPr/>
-        </p:nvPicPr>
-        <p:blipFill>
-          <a:blip r:embed="rId2"/>
-          <a:stretch>
-            <a:fillRect/>
-          </a:stretch>
-        </p:blipFill>
-        <p:spPr>
-          <a:xfrm>
-            <a:off x="6521893" y="2590376"/>
-            <a:ext cx="4826000" cy="2908300"/>
-          </a:xfrm>
-          <a:prstGeom prst="rect">
-            <a:avLst/>
-          </a:prstGeom>
-        </p:spPr>
-      </p:pic>
+              <a:t>This section covers branching, pull requests, and merging.</a:t>
+            </a:r>
+          </a:p>
+        </p:txBody>
+      </p:sp>
     </p:spTree>
     <p:extLst>
       <p:ext uri="{BB962C8B-B14F-4D97-AF65-F5344CB8AC3E}">
@@ -5677,7 +5640,7 @@
           <a:p>
             <a:r>
               <a:rPr lang="en-GB" dirty="0"/>
-              <a:t>Example: Dark Mode with CSS Variables</a:t>
+              <a:t>Git Branching</a:t>
             </a:r>
           </a:p>
         </p:txBody>
@@ -5710,24 +5673,47 @@
           </a:bodyPr>
           <a:lstStyle/>
           <a:p>
+            <a:r>
+              <a:rPr lang="en-GB" b="1" dirty="0"/>
+              <a:t>Why use branches?</a:t>
+            </a:r>
+            <a:endParaRPr lang="en-GB" dirty="0"/>
+          </a:p>
+          <a:p>
             <a:pPr>
               <a:buFont typeface="Arial" panose="020B0604020202020204" pitchFamily="34" charset="0"/>
               <a:buChar char="•"/>
             </a:pPr>
             <a:r>
               <a:rPr lang="en-GB" dirty="0"/>
-              <a:t>Use CSS variables to easily switch themes:</a:t>
-            </a:r>
-            <a:endParaRPr lang="en-GB" b="1" dirty="0"/>
+              <a:t>Each developer can work on a feature without affecting the main codebase.</a:t>
+            </a:r>
+          </a:p>
+          <a:p>
+            <a:pPr>
+              <a:buFont typeface="Arial" panose="020B0604020202020204" pitchFamily="34" charset="0"/>
+              <a:buChar char="•"/>
+            </a:pPr>
+            <a:r>
+              <a:rPr lang="en-GB" dirty="0"/>
+              <a:t>Avoids conflicts by isolating work.</a:t>
+            </a:r>
+          </a:p>
+          <a:p>
+            <a:r>
+              <a:rPr lang="en-GB" b="1" dirty="0"/>
+              <a:t>Creating a branch:</a:t>
+            </a:r>
+            <a:endParaRPr lang="en-GB" dirty="0"/>
           </a:p>
         </p:txBody>
       </p:sp>
       <p:pic>
         <p:nvPicPr>
-          <p:cNvPr id="6" name="Picture 5" descr="A screenshot of a computer program&#10;&#10;Description automatically generated">
+          <p:cNvPr id="5" name="Picture 4">
             <a:extLst>
               <a:ext uri="{FF2B5EF4-FFF2-40B4-BE49-F238E27FC236}">
-                <a16:creationId xmlns:a16="http://schemas.microsoft.com/office/drawing/2014/main" id="{232FBDFF-43F5-97B0-128C-733EB1C380E6}"/>
+                <a16:creationId xmlns:a16="http://schemas.microsoft.com/office/drawing/2014/main" id="{A2E30059-4AAC-D983-3A5F-5A99D74664B0}"/>
               </a:ext>
             </a:extLst>
           </p:cNvPr>
@@ -5744,8 +5730,8 @@
         </p:blipFill>
         <p:spPr>
           <a:xfrm>
-            <a:off x="6096000" y="1916973"/>
-            <a:ext cx="5664200" cy="4749800"/>
+            <a:off x="801565" y="5052646"/>
+            <a:ext cx="3695700" cy="457200"/>
           </a:xfrm>
           <a:prstGeom prst="rect">
             <a:avLst/>
@@ -5818,7 +5804,7 @@
           <a:p>
             <a:r>
               <a:rPr lang="en-GB" dirty="0"/>
-              <a:t>Real world use cases</a:t>
+              <a:t>Committing and Pushing Changes</a:t>
             </a:r>
           </a:p>
         </p:txBody>
@@ -5851,64 +5837,43 @@
           </a:bodyPr>
           <a:lstStyle/>
           <a:p>
-            <a:pPr marL="0" indent="0">
-              <a:buNone/>
-            </a:pPr>
-            <a:r>
-              <a:rPr lang="en-GB" dirty="0"/>
-              <a:t>Theming and Design Consistency</a:t>
-            </a:r>
-            <a:r>
-              <a:rPr lang="en-GB" b="1" dirty="0"/>
-              <a:t>:</a:t>
-            </a:r>
-            <a:br>
-              <a:rPr lang="en-GB" b="1" dirty="0"/>
-            </a:br>
-            <a:br>
-              <a:rPr lang="en-GB" dirty="0"/>
-            </a:br>
-            <a:r>
-              <a:rPr lang="en-GB" dirty="0"/>
-              <a:t>CSS variables are ideal for defining </a:t>
-            </a:r>
-            <a:r>
-              <a:rPr lang="en-GB" dirty="0" err="1"/>
-              <a:t>colors</a:t>
-            </a:r>
-            <a:r>
-              <a:rPr lang="en-GB" dirty="0"/>
-              <a:t>, fonts, spacing, and other design properties in one place.</a:t>
-            </a:r>
-          </a:p>
-          <a:p>
-            <a:pPr marL="0" indent="0">
-              <a:buNone/>
-            </a:pPr>
-            <a:r>
-              <a:rPr lang="en-GB" dirty="0"/>
-              <a:t> This ensures consistency across a website or app. For example, if you define a primary </a:t>
-            </a:r>
-            <a:r>
-              <a:rPr lang="en-GB" dirty="0" err="1"/>
-              <a:t>color</a:t>
-            </a:r>
-            <a:r>
-              <a:rPr lang="en-GB" dirty="0"/>
-              <a:t> as a </a:t>
-            </a:r>
-          </a:p>
-          <a:p>
-            <a:pPr marL="0" indent="0">
-              <a:buNone/>
-            </a:pPr>
-            <a:r>
-              <a:rPr lang="en-GB" dirty="0"/>
-              <a:t>variable, updating it in one location will automatically apply the change everywhere it's used.</a:t>
-            </a:r>
-          </a:p>
-        </p:txBody>
-      </p:sp>
+            <a:r>
+              <a:rPr lang="en-GB" dirty="0"/>
+              <a:t>Once you’ve made changes, commit and push them to the remote repository.</a:t>
+            </a:r>
+          </a:p>
+        </p:txBody>
+      </p:sp>
+      <p:pic>
+        <p:nvPicPr>
+          <p:cNvPr id="5" name="Picture 4" descr="A black background with green and white text&#10;&#10;Description automatically generated">
+            <a:extLst>
+              <a:ext uri="{FF2B5EF4-FFF2-40B4-BE49-F238E27FC236}">
+                <a16:creationId xmlns:a16="http://schemas.microsoft.com/office/drawing/2014/main" id="{24AE0E79-7D1F-25B5-6541-41CA0F9A2A40}"/>
+              </a:ext>
+            </a:extLst>
+          </p:cNvPr>
+          <p:cNvPicPr>
+            <a:picLocks noChangeAspect="1"/>
+          </p:cNvPicPr>
+          <p:nvPr/>
+        </p:nvPicPr>
+        <p:blipFill>
+          <a:blip r:embed="rId2"/>
+          <a:stretch>
+            <a:fillRect/>
+          </a:stretch>
+        </p:blipFill>
+        <p:spPr>
+          <a:xfrm>
+            <a:off x="6411545" y="3498426"/>
+            <a:ext cx="4292600" cy="1092200"/>
+          </a:xfrm>
+          <a:prstGeom prst="rect">
+            <a:avLst/>
+          </a:prstGeom>
+        </p:spPr>
+      </p:pic>
     </p:spTree>
     <p:extLst>
       <p:ext uri="{BB962C8B-B14F-4D97-AF65-F5344CB8AC3E}">
@@ -5923,6 +5888,323 @@
 </file>
 
 <file path=ppt/slides/slide15.xml><?xml version="1.0" encoding="utf-8"?>
+<p:sld xmlns:a="http://schemas.openxmlformats.org/drawingml/2006/main" xmlns:r="http://schemas.openxmlformats.org/officeDocument/2006/relationships" xmlns:p="http://schemas.openxmlformats.org/presentationml/2006/main">
+  <p:cSld>
+    <p:spTree>
+      <p:nvGrpSpPr>
+        <p:cNvPr id="1" name="">
+          <a:extLst>
+            <a:ext uri="{FF2B5EF4-FFF2-40B4-BE49-F238E27FC236}">
+              <a16:creationId xmlns:a16="http://schemas.microsoft.com/office/drawing/2014/main" id="{29E6B91C-C576-55A1-12F3-85CE6844FD17}"/>
+            </a:ext>
+          </a:extLst>
+        </p:cNvPr>
+        <p:cNvGrpSpPr/>
+        <p:nvPr/>
+      </p:nvGrpSpPr>
+      <p:grpSpPr>
+        <a:xfrm>
+          <a:off x="0" y="0"/>
+          <a:ext cx="0" cy="0"/>
+          <a:chOff x="0" y="0"/>
+          <a:chExt cx="0" cy="0"/>
+        </a:xfrm>
+      </p:grpSpPr>
+      <p:sp>
+        <p:nvSpPr>
+          <p:cNvPr id="2" name="Title 1">
+            <a:extLst>
+              <a:ext uri="{FF2B5EF4-FFF2-40B4-BE49-F238E27FC236}">
+                <a16:creationId xmlns:a16="http://schemas.microsoft.com/office/drawing/2014/main" id="{E6C37BE9-23FE-B139-298D-D5A9A5E263A8}"/>
+              </a:ext>
+            </a:extLst>
+          </p:cNvPr>
+          <p:cNvSpPr>
+            <a:spLocks noGrp="1"/>
+          </p:cNvSpPr>
+          <p:nvPr>
+            <p:ph type="title"/>
+          </p:nvPr>
+        </p:nvSpPr>
+        <p:spPr>
+          <a:xfrm>
+            <a:off x="581193" y="729658"/>
+            <a:ext cx="11029616" cy="988332"/>
+          </a:xfrm>
+        </p:spPr>
+        <p:txBody>
+          <a:bodyPr anchor="b">
+            <a:normAutofit/>
+          </a:bodyPr>
+          <a:lstStyle/>
+          <a:p>
+            <a:r>
+              <a:rPr lang="en-GB" dirty="0"/>
+              <a:t>Pull Requests and Merging</a:t>
+            </a:r>
+          </a:p>
+        </p:txBody>
+      </p:sp>
+      <p:sp>
+        <p:nvSpPr>
+          <p:cNvPr id="3" name="Content Placeholder 2">
+            <a:extLst>
+              <a:ext uri="{FF2B5EF4-FFF2-40B4-BE49-F238E27FC236}">
+                <a16:creationId xmlns:a16="http://schemas.microsoft.com/office/drawing/2014/main" id="{3AA67576-51D7-B126-1A81-0DC2D006161E}"/>
+              </a:ext>
+            </a:extLst>
+          </p:cNvPr>
+          <p:cNvSpPr>
+            <a:spLocks noGrp="1"/>
+          </p:cNvSpPr>
+          <p:nvPr>
+            <p:ph sz="half" idx="1"/>
+          </p:nvPr>
+        </p:nvSpPr>
+        <p:spPr>
+          <a:xfrm>
+            <a:off x="581193" y="2228003"/>
+            <a:ext cx="5422390" cy="3633047"/>
+          </a:xfrm>
+        </p:spPr>
+        <p:txBody>
+          <a:bodyPr anchor="ctr">
+            <a:normAutofit/>
+          </a:bodyPr>
+          <a:lstStyle/>
+          <a:p>
+            <a:r>
+              <a:rPr lang="en-GB" dirty="0"/>
+              <a:t>A </a:t>
+            </a:r>
+            <a:r>
+              <a:rPr lang="en-GB" b="1" dirty="0"/>
+              <a:t>pull request (PR)</a:t>
+            </a:r>
+            <a:r>
+              <a:rPr lang="en-GB" dirty="0"/>
+              <a:t> is how changes from a feature branch get reviewed and merged into the main branch.</a:t>
+            </a:r>
+          </a:p>
+          <a:p>
+            <a:r>
+              <a:rPr lang="en-GB" b="1" dirty="0"/>
+              <a:t>Pull Request Steps:</a:t>
+            </a:r>
+            <a:endParaRPr lang="en-GB" dirty="0"/>
+          </a:p>
+          <a:p>
+            <a:pPr>
+              <a:buFont typeface="+mj-lt"/>
+              <a:buAutoNum type="arabicPeriod"/>
+            </a:pPr>
+            <a:r>
+              <a:rPr lang="en-GB" dirty="0"/>
+              <a:t>Push your branch to GitHub.</a:t>
+            </a:r>
+          </a:p>
+          <a:p>
+            <a:pPr>
+              <a:buFont typeface="+mj-lt"/>
+              <a:buAutoNum type="arabicPeriod"/>
+            </a:pPr>
+            <a:r>
+              <a:rPr lang="en-GB" dirty="0"/>
+              <a:t>Open a pull request for review.</a:t>
+            </a:r>
+          </a:p>
+          <a:p>
+            <a:pPr>
+              <a:buFont typeface="+mj-lt"/>
+              <a:buAutoNum type="arabicPeriod"/>
+            </a:pPr>
+            <a:r>
+              <a:rPr lang="en-GB" dirty="0"/>
+              <a:t>Once approved, merge the branch.</a:t>
+            </a:r>
+          </a:p>
+        </p:txBody>
+      </p:sp>
+      <p:pic>
+        <p:nvPicPr>
+          <p:cNvPr id="6" name="Picture 5">
+            <a:extLst>
+              <a:ext uri="{FF2B5EF4-FFF2-40B4-BE49-F238E27FC236}">
+                <a16:creationId xmlns:a16="http://schemas.microsoft.com/office/drawing/2014/main" id="{233C779F-DF24-1885-4B0F-2E6447EF361A}"/>
+              </a:ext>
+            </a:extLst>
+          </p:cNvPr>
+          <p:cNvPicPr>
+            <a:picLocks noChangeAspect="1"/>
+          </p:cNvPicPr>
+          <p:nvPr/>
+        </p:nvPicPr>
+        <p:blipFill>
+          <a:blip r:embed="rId2"/>
+          <a:stretch>
+            <a:fillRect/>
+          </a:stretch>
+        </p:blipFill>
+        <p:spPr>
+          <a:xfrm>
+            <a:off x="6988419" y="3661019"/>
+            <a:ext cx="3162300" cy="520700"/>
+          </a:xfrm>
+          <a:prstGeom prst="rect">
+            <a:avLst/>
+          </a:prstGeom>
+        </p:spPr>
+      </p:pic>
+    </p:spTree>
+    <p:extLst>
+      <p:ext uri="{BB962C8B-B14F-4D97-AF65-F5344CB8AC3E}">
+        <p14:creationId xmlns:p14="http://schemas.microsoft.com/office/powerpoint/2010/main" val="206962121"/>
+      </p:ext>
+    </p:extLst>
+  </p:cSld>
+  <p:clrMapOvr>
+    <a:masterClrMapping/>
+  </p:clrMapOvr>
+</p:sld>
+</file>
+
+<file path=ppt/slides/slide16.xml><?xml version="1.0" encoding="utf-8"?>
+<p:sld xmlns:a="http://schemas.openxmlformats.org/drawingml/2006/main" xmlns:r="http://schemas.openxmlformats.org/officeDocument/2006/relationships" xmlns:p="http://schemas.openxmlformats.org/presentationml/2006/main">
+  <p:cSld>
+    <p:spTree>
+      <p:nvGrpSpPr>
+        <p:cNvPr id="1" name="">
+          <a:extLst>
+            <a:ext uri="{FF2B5EF4-FFF2-40B4-BE49-F238E27FC236}">
+              <a16:creationId xmlns:a16="http://schemas.microsoft.com/office/drawing/2014/main" id="{52B67145-3F2B-B149-CCBA-576D4A408CEF}"/>
+            </a:ext>
+          </a:extLst>
+        </p:cNvPr>
+        <p:cNvGrpSpPr/>
+        <p:nvPr/>
+      </p:nvGrpSpPr>
+      <p:grpSpPr>
+        <a:xfrm>
+          <a:off x="0" y="0"/>
+          <a:ext cx="0" cy="0"/>
+          <a:chOff x="0" y="0"/>
+          <a:chExt cx="0" cy="0"/>
+        </a:xfrm>
+      </p:grpSpPr>
+      <p:sp>
+        <p:nvSpPr>
+          <p:cNvPr id="2" name="Title 1">
+            <a:extLst>
+              <a:ext uri="{FF2B5EF4-FFF2-40B4-BE49-F238E27FC236}">
+                <a16:creationId xmlns:a16="http://schemas.microsoft.com/office/drawing/2014/main" id="{165BA438-7FFB-2A39-BAB5-D412DCB1688D}"/>
+              </a:ext>
+            </a:extLst>
+          </p:cNvPr>
+          <p:cNvSpPr>
+            <a:spLocks noGrp="1"/>
+          </p:cNvSpPr>
+          <p:nvPr>
+            <p:ph type="title"/>
+          </p:nvPr>
+        </p:nvSpPr>
+        <p:spPr>
+          <a:xfrm>
+            <a:off x="581193" y="729658"/>
+            <a:ext cx="11029616" cy="988332"/>
+          </a:xfrm>
+        </p:spPr>
+        <p:txBody>
+          <a:bodyPr anchor="b">
+            <a:normAutofit/>
+          </a:bodyPr>
+          <a:lstStyle/>
+          <a:p>
+            <a:r>
+              <a:rPr lang="en-GB" dirty="0"/>
+              <a:t>Branch Cleanup</a:t>
+            </a:r>
+          </a:p>
+        </p:txBody>
+      </p:sp>
+      <p:sp>
+        <p:nvSpPr>
+          <p:cNvPr id="3" name="Content Placeholder 2">
+            <a:extLst>
+              <a:ext uri="{FF2B5EF4-FFF2-40B4-BE49-F238E27FC236}">
+                <a16:creationId xmlns:a16="http://schemas.microsoft.com/office/drawing/2014/main" id="{61A7E92B-1A35-4BA3-4F6F-0938DAEA37B1}"/>
+              </a:ext>
+            </a:extLst>
+          </p:cNvPr>
+          <p:cNvSpPr>
+            <a:spLocks noGrp="1"/>
+          </p:cNvSpPr>
+          <p:nvPr>
+            <p:ph sz="half" idx="1"/>
+          </p:nvPr>
+        </p:nvSpPr>
+        <p:spPr>
+          <a:xfrm>
+            <a:off x="581193" y="2228003"/>
+            <a:ext cx="5422390" cy="3633047"/>
+          </a:xfrm>
+        </p:spPr>
+        <p:txBody>
+          <a:bodyPr anchor="ctr">
+            <a:normAutofit/>
+          </a:bodyPr>
+          <a:lstStyle/>
+          <a:p>
+            <a:r>
+              <a:rPr lang="en-GB" dirty="0"/>
+              <a:t>After merging, delete the old branch to keep the repository clean.</a:t>
+            </a:r>
+          </a:p>
+        </p:txBody>
+      </p:sp>
+      <p:pic>
+        <p:nvPicPr>
+          <p:cNvPr id="5" name="Picture 4">
+            <a:extLst>
+              <a:ext uri="{FF2B5EF4-FFF2-40B4-BE49-F238E27FC236}">
+                <a16:creationId xmlns:a16="http://schemas.microsoft.com/office/drawing/2014/main" id="{07AE4FFE-9435-DC43-53B1-3B7EDC1E345E}"/>
+              </a:ext>
+            </a:extLst>
+          </p:cNvPr>
+          <p:cNvPicPr>
+            <a:picLocks noChangeAspect="1"/>
+          </p:cNvPicPr>
+          <p:nvPr/>
+        </p:nvPicPr>
+        <p:blipFill>
+          <a:blip r:embed="rId2"/>
+          <a:stretch>
+            <a:fillRect/>
+          </a:stretch>
+        </p:blipFill>
+        <p:spPr>
+          <a:xfrm>
+            <a:off x="6375399" y="3771476"/>
+            <a:ext cx="3403600" cy="546100"/>
+          </a:xfrm>
+          <a:prstGeom prst="rect">
+            <a:avLst/>
+          </a:prstGeom>
+        </p:spPr>
+      </p:pic>
+    </p:spTree>
+    <p:extLst>
+      <p:ext uri="{BB962C8B-B14F-4D97-AF65-F5344CB8AC3E}">
+        <p14:creationId xmlns:p14="http://schemas.microsoft.com/office/powerpoint/2010/main" val="3409623304"/>
+      </p:ext>
+    </p:extLst>
+  </p:cSld>
+  <p:clrMapOvr>
+    <a:masterClrMapping/>
+  </p:clrMapOvr>
+</p:sld>
+</file>
+
+<file path=ppt/slides/slide17.xml><?xml version="1.0" encoding="utf-8"?>
 <p:sld xmlns:a="http://schemas.openxmlformats.org/drawingml/2006/main" xmlns:r="http://schemas.openxmlformats.org/officeDocument/2006/relationships" xmlns:p="http://schemas.openxmlformats.org/presentationml/2006/main">
   <p:cSld>
     <p:spTree>
@@ -6004,7 +6286,7 @@
         </p:spPr>
         <p:txBody>
           <a:bodyPr anchor="ctr">
-            <a:normAutofit fontScale="92500" lnSpcReduction="20000"/>
+            <a:normAutofit/>
           </a:bodyPr>
           <a:lstStyle/>
           <a:p>
@@ -6014,21 +6296,11 @@
             </a:pPr>
             <a:r>
               <a:rPr lang="en-GB" b="1" dirty="0"/>
-              <a:t>CSS Box Model</a:t>
-            </a:r>
-          </a:p>
-          <a:p>
-            <a:r>
-              <a:rPr lang="en-GB" dirty="0"/>
-              <a:t>The </a:t>
-            </a:r>
-            <a:r>
-              <a:rPr lang="en-GB" b="1" dirty="0"/>
-              <a:t>Box Model</a:t>
-            </a:r>
-            <a:r>
-              <a:rPr lang="en-GB" dirty="0"/>
-              <a:t> defines how elements are structured on a webpage. Every element is essentially a box made up of four parts:</a:t>
+              <a:t>Wireframing</a:t>
+            </a:r>
+            <a:r>
+              <a:rPr lang="en-GB" dirty="0"/>
+              <a:t> helps plan your website's layout.</a:t>
             </a:r>
           </a:p>
           <a:p>
@@ -6038,11 +6310,11 @@
             </a:pPr>
             <a:r>
               <a:rPr lang="en-GB" b="1" dirty="0"/>
-              <a:t>Content</a:t>
-            </a:r>
-            <a:r>
-              <a:rPr lang="en-GB" dirty="0"/>
-              <a:t>: The actual content inside the element.</a:t>
+              <a:t>Flexbox</a:t>
+            </a:r>
+            <a:r>
+              <a:rPr lang="en-GB" dirty="0"/>
+              <a:t> provides a powerful, flexible layout system.</a:t>
             </a:r>
           </a:p>
           <a:p>
@@ -6052,11 +6324,11 @@
             </a:pPr>
             <a:r>
               <a:rPr lang="en-GB" b="1" dirty="0"/>
-              <a:t>Padding</a:t>
-            </a:r>
-            <a:r>
-              <a:rPr lang="en-GB" dirty="0"/>
-              <a:t>: Space between the content and the border.</a:t>
+              <a:t>CSS transitions and transformations</a:t>
+            </a:r>
+            <a:r>
+              <a:rPr lang="en-GB" dirty="0"/>
+              <a:t> bring subtle animations and effects.</a:t>
             </a:r>
           </a:p>
           <a:p>
@@ -6066,39 +6338,12 @@
             </a:pPr>
             <a:r>
               <a:rPr lang="en-GB" b="1" dirty="0"/>
-              <a:t>Border</a:t>
-            </a:r>
-            <a:r>
-              <a:rPr lang="en-GB" dirty="0"/>
-              <a:t>: The edge surrounding the padding.</a:t>
-            </a:r>
-          </a:p>
-          <a:p>
-            <a:pPr>
-              <a:buFont typeface="Arial" panose="020B0604020202020204" pitchFamily="34" charset="0"/>
-              <a:buChar char="•"/>
-            </a:pPr>
-            <a:r>
-              <a:rPr lang="en-GB" b="1" dirty="0"/>
-              <a:t>Margin</a:t>
-            </a:r>
-            <a:r>
-              <a:rPr lang="en-GB" dirty="0"/>
-              <a:t>: Space outside the border, separating the element from others.</a:t>
-            </a:r>
-          </a:p>
-          <a:p>
-            <a:r>
-              <a:rPr lang="en-GB" dirty="0"/>
-              <a:t>We learned how to use properties like padding, border, and margin to control the layout and spacing of elements.</a:t>
-            </a:r>
-          </a:p>
-          <a:p>
-            <a:pPr>
-              <a:buFont typeface="Arial" panose="020B0604020202020204" pitchFamily="34" charset="0"/>
-              <a:buChar char="•"/>
-            </a:pPr>
-            <a:endParaRPr lang="en-GB" dirty="0"/>
+              <a:t>Git collaboration</a:t>
+            </a:r>
+            <a:r>
+              <a:rPr lang="en-GB" dirty="0"/>
+              <a:t> ensures smooth teamwork through branches and pull requests.</a:t>
+            </a:r>
           </a:p>
         </p:txBody>
       </p:sp>
@@ -6336,8 +6581,33 @@
             </a:pPr>
             <a:r>
               <a:rPr lang="en-GB" b="1" dirty="0"/>
-              <a:t>MDN Web Docs – CSS Box Model: </a:t>
-            </a:r>
+              <a:t>Website Wireframe Beginner's Guide</a:t>
+            </a:r>
+            <a:r>
+              <a:rPr lang="en-GB" dirty="0"/>
+              <a:t>: https://</a:t>
+            </a:r>
+            <a:r>
+              <a:rPr lang="en-GB" dirty="0" err="1"/>
+              <a:t>blog.hubspot.com</a:t>
+            </a:r>
+            <a:r>
+              <a:rPr lang="en-GB" dirty="0"/>
+              <a:t>/website/website-wireframe</a:t>
+            </a:r>
+          </a:p>
+          <a:p>
+            <a:pPr>
+              <a:buFont typeface="Arial" panose="020B0604020202020204" pitchFamily="34" charset="0"/>
+              <a:buChar char="•"/>
+            </a:pPr>
+            <a:r>
+              <a:rPr lang="en-GB" b="1" dirty="0"/>
+              <a:t>CSS Tricks: A Complete Guide to Flexbox: </a:t>
+            </a:r>
+            <a:br>
+              <a:rPr lang="en-GB" b="1" dirty="0"/>
+            </a:br>
             <a:r>
               <a:rPr lang="en-GB" dirty="0">
                 <a:hlinkClick r:id="rId2">
@@ -6348,7 +6618,7 @@
                   </a:extLst>
                 </a:hlinkClick>
               </a:rPr>
-              <a:t>https://developer.mozilla.org/en-US/docs/Learn/CSS/Building_blocks/The_box_model</a:t>
+              <a:t>https://css-tricks.com/snippets/css/a-guide-to-flexbox/</a:t>
             </a:r>
             <a:endParaRPr lang="en-GB" dirty="0"/>
           </a:p>
@@ -6359,23 +6629,38 @@
             </a:pPr>
             <a:r>
               <a:rPr lang="en-GB" b="1" dirty="0"/>
-              <a:t>CSS-Tricks – CSS Box Model: </a:t>
+              <a:t>Git Branches in a Nutshell</a:t>
             </a:r>
             <a:br>
               <a:rPr lang="en-GB" b="1" dirty="0"/>
             </a:br>
             <a:r>
               <a:rPr lang="en-GB" dirty="0"/>
-              <a:t>https://css-</a:t>
+              <a:t>https://git-</a:t>
             </a:r>
             <a:r>
               <a:rPr lang="en-GB" dirty="0" err="1"/>
-              <a:t>tricks.com</a:t>
-            </a:r>
-            <a:r>
-              <a:rPr lang="en-GB" dirty="0"/>
-              <a:t>/the-css-box-model/</a:t>
-            </a:r>
+              <a:t>scm.com</a:t>
+            </a:r>
+            <a:r>
+              <a:rPr lang="en-GB" dirty="0"/>
+              <a:t>/book/</a:t>
+            </a:r>
+            <a:r>
+              <a:rPr lang="en-GB" dirty="0" err="1"/>
+              <a:t>en</a:t>
+            </a:r>
+            <a:r>
+              <a:rPr lang="en-GB" dirty="0"/>
+              <a:t>/v2/Git-Branching-Branches-in-a-Nutshell</a:t>
+            </a:r>
+          </a:p>
+          <a:p>
+            <a:pPr>
+              <a:buFont typeface="Arial" panose="020B0604020202020204" pitchFamily="34" charset="0"/>
+              <a:buChar char="•"/>
+            </a:pPr>
+            <a:endParaRPr lang="en-GB" dirty="0"/>
           </a:p>
         </p:txBody>
       </p:sp>
@@ -6392,7 +6677,7 @@
 </p:sld>
 </file>
 
-<file path=ppt/slides/slide16.xml><?xml version="1.0" encoding="utf-8"?>
+<file path=ppt/slides/slide18.xml><?xml version="1.0" encoding="utf-8"?>
 <p:sld xmlns:a="http://schemas.openxmlformats.org/drawingml/2006/main" xmlns:r="http://schemas.openxmlformats.org/officeDocument/2006/relationships" xmlns:p="http://schemas.openxmlformats.org/presentationml/2006/main">
   <p:cSld>
     <p:spTree>
@@ -6837,7 +7122,7 @@
 </p:sld>
 </file>
 
-<file path=ppt/slides/slide17.xml><?xml version="1.0" encoding="utf-8"?>
+<file path=ppt/slides/slide19.xml><?xml version="1.0" encoding="utf-8"?>
 <p:sld xmlns:a="http://schemas.openxmlformats.org/drawingml/2006/main" xmlns:r="http://schemas.openxmlformats.org/officeDocument/2006/relationships" xmlns:p="http://schemas.openxmlformats.org/presentationml/2006/main">
   <p:cSld>
     <p:spTree>
@@ -7255,76 +7540,6 @@
 </p:sld>
 </file>
 
-<file path=ppt/slides/slide18.xml><?xml version="1.0" encoding="utf-8"?>
-<p:sld xmlns:a="http://schemas.openxmlformats.org/drawingml/2006/main" xmlns:r="http://schemas.openxmlformats.org/officeDocument/2006/relationships" xmlns:p="http://schemas.openxmlformats.org/presentationml/2006/main">
-  <p:cSld>
-    <p:spTree>
-      <p:nvGrpSpPr>
-        <p:cNvPr id="1" name=""/>
-        <p:cNvGrpSpPr/>
-        <p:nvPr/>
-      </p:nvGrpSpPr>
-      <p:grpSpPr>
-        <a:xfrm>
-          <a:off x="0" y="0"/>
-          <a:ext cx="0" cy="0"/>
-          <a:chOff x="0" y="0"/>
-          <a:chExt cx="0" cy="0"/>
-        </a:xfrm>
-      </p:grpSpPr>
-      <p:sp>
-        <p:nvSpPr>
-          <p:cNvPr id="2" name="Title 1">
-            <a:extLst>
-              <a:ext uri="{FF2B5EF4-FFF2-40B4-BE49-F238E27FC236}">
-                <a16:creationId xmlns:a16="http://schemas.microsoft.com/office/drawing/2014/main" id="{2BF4E187-63BA-683D-B61F-11A4E6D447F4}"/>
-              </a:ext>
-            </a:extLst>
-          </p:cNvPr>
-          <p:cNvSpPr>
-            <a:spLocks noGrp="1"/>
-          </p:cNvSpPr>
-          <p:nvPr>
-            <p:ph type="title"/>
-          </p:nvPr>
-        </p:nvSpPr>
-        <p:spPr>
-          <a:xfrm>
-            <a:off x="581192" y="3077494"/>
-            <a:ext cx="11029616" cy="1013800"/>
-          </a:xfrm>
-        </p:spPr>
-        <p:txBody>
-          <a:bodyPr>
-            <a:normAutofit/>
-          </a:bodyPr>
-          <a:lstStyle/>
-          <a:p>
-            <a:pPr algn="ctr"/>
-            <a:r>
-              <a:rPr lang="en-GB" sz="4000" dirty="0">
-                <a:solidFill>
-                  <a:schemeClr val="accent1"/>
-                </a:solidFill>
-              </a:rPr>
-              <a:t>Questions?</a:t>
-            </a:r>
-          </a:p>
-        </p:txBody>
-      </p:sp>
-    </p:spTree>
-    <p:extLst>
-      <p:ext uri="{BB962C8B-B14F-4D97-AF65-F5344CB8AC3E}">
-        <p14:creationId xmlns:p14="http://schemas.microsoft.com/office/powerpoint/2010/main" val="1881208565"/>
-      </p:ext>
-    </p:extLst>
-  </p:cSld>
-  <p:clrMapOvr>
-    <a:masterClrMapping/>
-  </p:clrMapOvr>
-</p:sld>
-</file>
-
 <file path=ppt/slides/slide2.xml><?xml version="1.0" encoding="utf-8"?>
 <p:sld xmlns:a="http://schemas.openxmlformats.org/drawingml/2006/main" xmlns:r="http://schemas.openxmlformats.org/officeDocument/2006/relationships" xmlns:p="http://schemas.openxmlformats.org/presentationml/2006/main">
   <p:cSld>
@@ -7372,7 +7587,7 @@
           <a:p>
             <a:r>
               <a:rPr lang="en-GB" dirty="0"/>
-              <a:t>Introduction to CSS Box Model, Borders, and Variables</a:t>
+              <a:t>Flexbox and Git Collaboration</a:t>
             </a:r>
           </a:p>
         </p:txBody>
@@ -7413,17 +7628,44 @@
           <a:p>
             <a:r>
               <a:rPr lang="en-GB" dirty="0"/>
-              <a:t>In this lesson, we will be introduced to CSS Box Model, CSS Borders, border-radius, Box-shadow, CSS Variables and Examples and Real-World Use Cases</a:t>
-            </a:r>
+              <a:t>In this lesson, we will be introduced to:</a:t>
+            </a:r>
+          </a:p>
+          <a:p>
+            <a:r>
+              <a:rPr lang="en-GB" dirty="0"/>
+              <a:t>Wireframing and layout planning using Microsoft Excel or Google Sheets.</a:t>
+            </a:r>
+          </a:p>
+          <a:p>
+            <a:r>
+              <a:rPr lang="en-GB" dirty="0"/>
+              <a:t>Flexbox fundamentals: display: flex, flex-direction, and flex-wrap.</a:t>
+            </a:r>
+          </a:p>
+          <a:p>
+            <a:r>
+              <a:rPr lang="en-GB" dirty="0"/>
+              <a:t>Flexbox alignment: justify-content, align-items, and understanding the flex axis.</a:t>
+            </a:r>
+          </a:p>
+          <a:p>
+            <a:r>
+              <a:rPr lang="en-GB" dirty="0"/>
+              <a:t>Git collaboration using branches and pull requests.</a:t>
+            </a:r>
+          </a:p>
+          <a:p>
+            <a:endParaRPr lang="en-GB" dirty="0"/>
           </a:p>
         </p:txBody>
       </p:sp>
       <p:pic>
         <p:nvPicPr>
-          <p:cNvPr id="7" name="Picture 6" descr="A screenshot of a computer code&#10;&#10;Description automatically generated">
+          <p:cNvPr id="5" name="Picture 4" descr="A green squares with white text&#10;&#10;Description automatically generated">
             <a:extLst>
               <a:ext uri="{FF2B5EF4-FFF2-40B4-BE49-F238E27FC236}">
-                <a16:creationId xmlns:a16="http://schemas.microsoft.com/office/drawing/2014/main" id="{64DB9439-BBF3-8EEC-8DC8-3DA4D96E9D98}"/>
+                <a16:creationId xmlns:a16="http://schemas.microsoft.com/office/drawing/2014/main" id="{AEDF6EDA-0927-03B0-14F2-67BCD83E4939}"/>
               </a:ext>
             </a:extLst>
           </p:cNvPr>
@@ -7440,8 +7682,8 @@
         </p:blipFill>
         <p:spPr>
           <a:xfrm>
-            <a:off x="6282593" y="2870200"/>
-            <a:ext cx="5816600" cy="2641600"/>
+            <a:off x="6870258" y="2046231"/>
+            <a:ext cx="4495948" cy="4443158"/>
           </a:xfrm>
           <a:prstGeom prst="rect">
             <a:avLst/>
@@ -7452,6 +7694,76 @@
     <p:extLst>
       <p:ext uri="{BB962C8B-B14F-4D97-AF65-F5344CB8AC3E}">
         <p14:creationId xmlns:p14="http://schemas.microsoft.com/office/powerpoint/2010/main" val="2112965492"/>
+      </p:ext>
+    </p:extLst>
+  </p:cSld>
+  <p:clrMapOvr>
+    <a:masterClrMapping/>
+  </p:clrMapOvr>
+</p:sld>
+</file>
+
+<file path=ppt/slides/slide20.xml><?xml version="1.0" encoding="utf-8"?>
+<p:sld xmlns:a="http://schemas.openxmlformats.org/drawingml/2006/main" xmlns:r="http://schemas.openxmlformats.org/officeDocument/2006/relationships" xmlns:p="http://schemas.openxmlformats.org/presentationml/2006/main">
+  <p:cSld>
+    <p:spTree>
+      <p:nvGrpSpPr>
+        <p:cNvPr id="1" name=""/>
+        <p:cNvGrpSpPr/>
+        <p:nvPr/>
+      </p:nvGrpSpPr>
+      <p:grpSpPr>
+        <a:xfrm>
+          <a:off x="0" y="0"/>
+          <a:ext cx="0" cy="0"/>
+          <a:chOff x="0" y="0"/>
+          <a:chExt cx="0" cy="0"/>
+        </a:xfrm>
+      </p:grpSpPr>
+      <p:sp>
+        <p:nvSpPr>
+          <p:cNvPr id="2" name="Title 1">
+            <a:extLst>
+              <a:ext uri="{FF2B5EF4-FFF2-40B4-BE49-F238E27FC236}">
+                <a16:creationId xmlns:a16="http://schemas.microsoft.com/office/drawing/2014/main" id="{2BF4E187-63BA-683D-B61F-11A4E6D447F4}"/>
+              </a:ext>
+            </a:extLst>
+          </p:cNvPr>
+          <p:cNvSpPr>
+            <a:spLocks noGrp="1"/>
+          </p:cNvSpPr>
+          <p:nvPr>
+            <p:ph type="title"/>
+          </p:nvPr>
+        </p:nvSpPr>
+        <p:spPr>
+          <a:xfrm>
+            <a:off x="581192" y="3077494"/>
+            <a:ext cx="11029616" cy="1013800"/>
+          </a:xfrm>
+        </p:spPr>
+        <p:txBody>
+          <a:bodyPr>
+            <a:normAutofit/>
+          </a:bodyPr>
+          <a:lstStyle/>
+          <a:p>
+            <a:pPr algn="ctr"/>
+            <a:r>
+              <a:rPr lang="en-GB" sz="4000" dirty="0">
+                <a:solidFill>
+                  <a:schemeClr val="accent1"/>
+                </a:solidFill>
+              </a:rPr>
+              <a:t>Questions?</a:t>
+            </a:r>
+          </a:p>
+        </p:txBody>
+      </p:sp>
+    </p:spTree>
+    <p:extLst>
+      <p:ext uri="{BB962C8B-B14F-4D97-AF65-F5344CB8AC3E}">
+        <p14:creationId xmlns:p14="http://schemas.microsoft.com/office/powerpoint/2010/main" val="1881208565"/>
       </p:ext>
     </p:extLst>
   </p:cSld>
@@ -7508,7 +7820,7 @@
           <a:p>
             <a:r>
               <a:rPr lang="en-GB" dirty="0"/>
-              <a:t>Introduction to CSS Box Model</a:t>
+              <a:t>Wireframing and Layout Planning</a:t>
             </a:r>
           </a:p>
         </p:txBody>
@@ -7550,85 +7862,54 @@
             </a:pPr>
             <a:r>
               <a:rPr lang="en-GB" dirty="0"/>
-              <a:t>Definition: </a:t>
-            </a:r>
-            <a:r>
-              <a:rPr lang="en-GB" b="1" dirty="0"/>
-              <a:t>The CSS Box Model</a:t>
-            </a:r>
-            <a:r>
-              <a:rPr lang="en-GB" dirty="0"/>
-              <a:t> is a fundamental concept for understanding how elements are structured and rendered in the browser..</a:t>
+              <a:t>Definition: Wireframing is an essential step in designing the structure of your website before diving into code. </a:t>
             </a:r>
           </a:p>
           <a:p>
             <a:pPr>
+              <a:lnSpc>
+                <a:spcPct val="90000"/>
+              </a:lnSpc>
               <a:buFont typeface="Arial" panose="020B0604020202020204" pitchFamily="34" charset="0"/>
               <a:buChar char="•"/>
             </a:pPr>
             <a:r>
               <a:rPr lang="en-GB" dirty="0"/>
-              <a:t>It consists of:</a:t>
-            </a:r>
-          </a:p>
-          <a:p>
-            <a:pPr marL="742950" lvl="1" indent="-285750">
-              <a:buFont typeface="Arial" panose="020B0604020202020204" pitchFamily="34" charset="0"/>
-              <a:buChar char="•"/>
-            </a:pPr>
-            <a:r>
-              <a:rPr lang="en-GB" b="1" dirty="0"/>
-              <a:t>Content</a:t>
-            </a:r>
-            <a:r>
-              <a:rPr lang="en-GB" dirty="0"/>
-              <a:t>: The actual content (text, images, etc.)</a:t>
-            </a:r>
-          </a:p>
-          <a:p>
-            <a:pPr marL="742950" lvl="1" indent="-285750">
-              <a:buFont typeface="Arial" panose="020B0604020202020204" pitchFamily="34" charset="0"/>
-              <a:buChar char="•"/>
-            </a:pPr>
-            <a:r>
-              <a:rPr lang="en-GB" b="1" dirty="0"/>
-              <a:t>Padding</a:t>
-            </a:r>
-            <a:r>
-              <a:rPr lang="en-GB" dirty="0"/>
-              <a:t>: Space between the content and the border</a:t>
-            </a:r>
-          </a:p>
-          <a:p>
-            <a:pPr marL="742950" lvl="1" indent="-285750">
-              <a:buFont typeface="Arial" panose="020B0604020202020204" pitchFamily="34" charset="0"/>
-              <a:buChar char="•"/>
-            </a:pPr>
-            <a:r>
-              <a:rPr lang="en-GB" b="1" dirty="0"/>
-              <a:t>Border</a:t>
-            </a:r>
-            <a:r>
-              <a:rPr lang="en-GB" dirty="0"/>
-              <a:t>: The line surrounding the padding (optional)</a:t>
-            </a:r>
-          </a:p>
-          <a:p>
-            <a:pPr marL="742950" lvl="1" indent="-285750">
-              <a:buFont typeface="Arial" panose="020B0604020202020204" pitchFamily="34" charset="0"/>
-              <a:buChar char="•"/>
-            </a:pPr>
-            <a:r>
-              <a:rPr lang="en-GB" b="1" dirty="0"/>
-              <a:t>Margin</a:t>
-            </a:r>
-            <a:r>
-              <a:rPr lang="en-GB" dirty="0"/>
-              <a:t>: Space outside the border that separates elements from others</a:t>
-            </a:r>
-          </a:p>
-        </p:txBody>
-      </p:sp>
+              <a:t>This gives you a visual blueprint of where elements will be placed and how they will be grouped.</a:t>
+            </a:r>
+          </a:p>
+        </p:txBody>
+      </p:sp>
+      <p:pic>
+        <p:nvPicPr>
+          <p:cNvPr id="5" name="Picture 4" descr="A screenshot of a computer&#10;&#10;Description automatically generated">
+            <a:extLst>
+              <a:ext uri="{FF2B5EF4-FFF2-40B4-BE49-F238E27FC236}">
+                <a16:creationId xmlns:a16="http://schemas.microsoft.com/office/drawing/2014/main" id="{1906F104-1882-BB14-44DD-BA33CFFC01E6}"/>
+              </a:ext>
+            </a:extLst>
+          </p:cNvPr>
+          <p:cNvPicPr>
+            <a:picLocks noChangeAspect="1"/>
+          </p:cNvPicPr>
+          <p:nvPr/>
+        </p:nvPicPr>
+        <p:blipFill>
+          <a:blip r:embed="rId3"/>
+          <a:stretch>
+            <a:fillRect/>
+          </a:stretch>
+        </p:blipFill>
+        <p:spPr>
+          <a:xfrm>
+            <a:off x="6188419" y="2005265"/>
+            <a:ext cx="5145000" cy="4493913"/>
+          </a:xfrm>
+          <a:prstGeom prst="rect">
+            <a:avLst/>
+          </a:prstGeom>
+        </p:spPr>
+      </p:pic>
     </p:spTree>
     <p:extLst>
       <p:ext uri="{BB962C8B-B14F-4D97-AF65-F5344CB8AC3E}">
@@ -7695,7 +7976,7 @@
           <a:p>
             <a:r>
               <a:rPr lang="en-GB" dirty="0"/>
-              <a:t>CSS Box Model Example</a:t>
+              <a:t>Tools for Wireframing</a:t>
             </a:r>
           </a:p>
         </p:txBody>
@@ -7724,21 +8005,24 @@
         </p:spPr>
         <p:txBody>
           <a:bodyPr anchor="ctr">
-            <a:normAutofit/>
+            <a:normAutofit fontScale="92500" lnSpcReduction="20000"/>
           </a:bodyPr>
           <a:lstStyle/>
+          <a:p>
+            <a:r>
+              <a:rPr lang="en-GB" b="1" dirty="0"/>
+              <a:t>Why use tools like Microsoft Excel or Google Sheets?</a:t>
+            </a:r>
+            <a:endParaRPr lang="en-GB" dirty="0"/>
+          </a:p>
           <a:p>
             <a:pPr>
               <a:buFont typeface="Arial" panose="020B0604020202020204" pitchFamily="34" charset="0"/>
               <a:buChar char="•"/>
             </a:pPr>
             <a:r>
-              <a:rPr lang="en-GB" b="1" dirty="0"/>
-              <a:t>Content</a:t>
-            </a:r>
-            <a:r>
-              <a:rPr lang="en-GB" dirty="0"/>
-              <a:t>: 200px width</a:t>
+              <a:rPr lang="en-GB" dirty="0"/>
+              <a:t>Simple, grid-based layout planning.</a:t>
             </a:r>
           </a:p>
           <a:p>
@@ -7747,12 +8031,8 @@
               <a:buChar char="•"/>
             </a:pPr>
             <a:r>
-              <a:rPr lang="en-GB" b="1" dirty="0"/>
-              <a:t>Padding</a:t>
-            </a:r>
-            <a:r>
-              <a:rPr lang="en-GB" dirty="0"/>
-              <a:t>: 20px</a:t>
+              <a:rPr lang="en-GB" dirty="0"/>
+              <a:t>Easy to modify and collaborate on.</a:t>
             </a:r>
           </a:p>
           <a:p>
@@ -7761,50 +8041,58 @@
               <a:buChar char="•"/>
             </a:pPr>
             <a:r>
-              <a:rPr lang="en-GB" b="1" dirty="0"/>
-              <a:t>Border</a:t>
-            </a:r>
-            <a:r>
-              <a:rPr lang="en-GB" dirty="0"/>
-              <a:t>: 5px solid</a:t>
-            </a:r>
-          </a:p>
-          <a:p>
-            <a:pPr>
-              <a:buFont typeface="Arial" panose="020B0604020202020204" pitchFamily="34" charset="0"/>
-              <a:buChar char="•"/>
-            </a:pPr>
-            <a:r>
-              <a:rPr lang="en-GB" b="1" dirty="0"/>
-              <a:t>Margin</a:t>
-            </a:r>
-            <a:r>
-              <a:rPr lang="en-GB" dirty="0"/>
-              <a:t>: 10px</a:t>
-            </a:r>
-          </a:p>
-          <a:p>
-            <a:pPr>
-              <a:buFont typeface="Arial" panose="020B0604020202020204" pitchFamily="34" charset="0"/>
-              <a:buChar char="•"/>
-            </a:pPr>
-            <a:r>
-              <a:rPr lang="en-GB" b="1" dirty="0"/>
-              <a:t>Total width</a:t>
-            </a:r>
-            <a:r>
-              <a:rPr lang="en-GB" dirty="0"/>
-              <a:t>: width + padding + border + margin = 200 + 20 + 5 + 10 = 235px</a:t>
+              <a:rPr lang="en-GB" dirty="0"/>
+              <a:t>Quick to set up without learning new design software.</a:t>
+            </a:r>
+            <a:br>
+              <a:rPr lang="en-GB" dirty="0"/>
+            </a:br>
+            <a:br>
+              <a:rPr lang="en-GB" dirty="0"/>
+            </a:br>
+            <a:r>
+              <a:rPr lang="en-GB" dirty="0"/>
+              <a:t>Example:</a:t>
+            </a:r>
+            <a:br>
+              <a:rPr lang="en-GB" dirty="0"/>
+            </a:br>
+            <a:br>
+              <a:rPr lang="en-GB" dirty="0"/>
+            </a:br>
+            <a:r>
+              <a:rPr lang="en-GB" dirty="0"/>
+              <a:t>Create a 3x3 grid to represent the website structure.</a:t>
+            </a:r>
+            <a:br>
+              <a:rPr lang="en-GB" dirty="0"/>
+            </a:br>
+            <a:br>
+              <a:rPr lang="en-GB" dirty="0"/>
+            </a:br>
+            <a:r>
+              <a:rPr lang="en-GB" dirty="0"/>
+              <a:t>Plan for a header, content sections, and footer.</a:t>
+            </a:r>
+            <a:br>
+              <a:rPr lang="en-GB" dirty="0"/>
+            </a:br>
+            <a:br>
+              <a:rPr lang="en-GB" dirty="0"/>
+            </a:br>
+            <a:r>
+              <a:rPr lang="en-GB" dirty="0"/>
+              <a:t>Demo…</a:t>
             </a:r>
           </a:p>
         </p:txBody>
       </p:sp>
       <p:pic>
         <p:nvPicPr>
-          <p:cNvPr id="8" name="Picture 7" descr="A black screen with a black background&#10;&#10;Description automatically generated">
+          <p:cNvPr id="5" name="Picture 4" descr="A screenshot of a computer&#10;&#10;Description automatically generated">
             <a:extLst>
               <a:ext uri="{FF2B5EF4-FFF2-40B4-BE49-F238E27FC236}">
-                <a16:creationId xmlns:a16="http://schemas.microsoft.com/office/drawing/2014/main" id="{FA249FC7-D879-0457-3BF2-95CC4CA0AFC6}"/>
+                <a16:creationId xmlns:a16="http://schemas.microsoft.com/office/drawing/2014/main" id="{003951C3-06FC-E367-221F-731E866562FF}"/>
               </a:ext>
             </a:extLst>
           </p:cNvPr>
@@ -7821,8 +8109,8 @@
         </p:blipFill>
         <p:spPr>
           <a:xfrm>
-            <a:off x="4596808" y="2426935"/>
-            <a:ext cx="7429711" cy="1781835"/>
+            <a:off x="6063566" y="1892597"/>
+            <a:ext cx="5520583" cy="4848445"/>
           </a:xfrm>
           <a:prstGeom prst="rect">
             <a:avLst/>
@@ -7895,7 +8183,7 @@
           <a:p>
             <a:r>
               <a:rPr lang="en-GB" dirty="0"/>
-              <a:t>CSS Borders: Basic Properties</a:t>
+              <a:t>Flexbox Basics</a:t>
             </a:r>
           </a:p>
         </p:txBody>
@@ -7934,7 +8222,7 @@
             </a:pPr>
             <a:r>
               <a:rPr lang="en-GB" dirty="0"/>
-              <a:t>Borders define the edges of an element.</a:t>
+              <a:t>Flexbox is a powerful tool for creating responsive layouts. </a:t>
             </a:r>
           </a:p>
           <a:p>
@@ -7943,68 +8231,8 @@
               <a:buChar char="•"/>
             </a:pPr>
             <a:r>
-              <a:rPr lang="en-GB" b="1" dirty="0"/>
-              <a:t>Properties</a:t>
-            </a:r>
-            <a:r>
-              <a:rPr lang="en-GB" dirty="0"/>
-              <a:t>:</a:t>
-            </a:r>
-          </a:p>
-          <a:p>
-            <a:pPr marL="742950" lvl="1" indent="-285750">
-              <a:buFont typeface="Arial" panose="020B0604020202020204" pitchFamily="34" charset="0"/>
-              <a:buChar char="•"/>
-            </a:pPr>
-            <a:r>
-              <a:rPr lang="en-GB" dirty="0"/>
-              <a:t>border-width: Specifies the thickness (e.g., 2px)</a:t>
-            </a:r>
-          </a:p>
-          <a:p>
-            <a:pPr marL="742950" lvl="1" indent="-285750">
-              <a:buFont typeface="Arial" panose="020B0604020202020204" pitchFamily="34" charset="0"/>
-              <a:buChar char="•"/>
-            </a:pPr>
-            <a:r>
-              <a:rPr lang="en-GB" dirty="0"/>
-              <a:t>border-style: Defines the style (e.g., solid, dashed, dotted)</a:t>
-            </a:r>
-          </a:p>
-          <a:p>
-            <a:pPr marL="742950" lvl="1" indent="-285750">
-              <a:buFont typeface="Arial" panose="020B0604020202020204" pitchFamily="34" charset="0"/>
-              <a:buChar char="•"/>
-            </a:pPr>
-            <a:r>
-              <a:rPr lang="en-GB" dirty="0"/>
-              <a:t>border-</a:t>
-            </a:r>
-            <a:r>
-              <a:rPr lang="en-GB" dirty="0" err="1"/>
-              <a:t>color</a:t>
-            </a:r>
-            <a:r>
-              <a:rPr lang="en-GB" dirty="0"/>
-              <a:t>: Sets the </a:t>
-            </a:r>
-            <a:r>
-              <a:rPr lang="en-GB" dirty="0" err="1"/>
-              <a:t>color</a:t>
-            </a:r>
-            <a:r>
-              <a:rPr lang="en-GB" dirty="0"/>
-              <a:t> (e.g., red, #333)</a:t>
-            </a:r>
-          </a:p>
-          <a:p>
-            <a:pPr>
-              <a:buFont typeface="Arial" panose="020B0604020202020204" pitchFamily="34" charset="0"/>
-              <a:buChar char="•"/>
-            </a:pPr>
-            <a:r>
-              <a:rPr lang="en-GB" dirty="0"/>
-              <a:t>Borders can be applied to each side (border-top, border-right, etc.) or as shorthand.</a:t>
+              <a:rPr lang="en-GB" dirty="0"/>
+              <a:t>It allows you to align elements dynamically across different screen sizes.</a:t>
             </a:r>
           </a:p>
         </p:txBody>
@@ -8075,7 +8303,7 @@
           <a:p>
             <a:r>
               <a:rPr lang="en-GB" dirty="0"/>
-              <a:t>CSS Selectors: Universal, Element, Class, and ID</a:t>
+              <a:t>display: flex</a:t>
             </a:r>
           </a:p>
         </p:txBody>
@@ -8109,22 +8337,44 @@
           <a:lstStyle/>
           <a:p>
             <a:r>
+              <a:rPr lang="en-GB" dirty="0"/>
+              <a:t>display: flex</a:t>
+            </a:r>
+            <a:br>
+              <a:rPr lang="en-GB" dirty="0"/>
+            </a:br>
+            <a:br>
+              <a:rPr lang="en-GB" dirty="0"/>
+            </a:br>
+            <a:r>
               <a:rPr lang="en-GB" b="1" dirty="0"/>
-              <a:t>Result:</a:t>
-            </a:r>
-            <a:r>
-              <a:rPr lang="en-GB" dirty="0"/>
-              <a:t> A blue solid border with 3px thickness.</a:t>
+              <a:t>display: flex</a:t>
+            </a:r>
+            <a:r>
+              <a:rPr lang="en-GB" dirty="0"/>
+              <a:t> turns a container into a Flexbox container. </a:t>
+            </a:r>
+          </a:p>
+          <a:p>
+            <a:r>
+              <a:rPr lang="en-GB" dirty="0"/>
+              <a:t>This affects how its child elements are laid out.</a:t>
+            </a:r>
+          </a:p>
+          <a:p>
+            <a:r>
+              <a:rPr lang="en-GB" dirty="0"/>
+              <a:t>Items inside .container will now follow Flexbox rules for alignment and positioning.</a:t>
             </a:r>
           </a:p>
         </p:txBody>
       </p:sp>
       <p:pic>
         <p:nvPicPr>
-          <p:cNvPr id="5" name="Picture 4" descr="A black background with white text&#10;&#10;Description automatically generated">
+          <p:cNvPr id="6" name="Picture 5" descr="A black screen with white text&#10;&#10;Description automatically generated">
             <a:extLst>
               <a:ext uri="{FF2B5EF4-FFF2-40B4-BE49-F238E27FC236}">
-                <a16:creationId xmlns:a16="http://schemas.microsoft.com/office/drawing/2014/main" id="{0DC39A08-AE76-FAEA-6C09-DA7735522B2F}"/>
+                <a16:creationId xmlns:a16="http://schemas.microsoft.com/office/drawing/2014/main" id="{E44361A8-02F1-1395-35B2-03257F0B4E05}"/>
               </a:ext>
             </a:extLst>
           </p:cNvPr>
@@ -8141,8 +8391,8 @@
         </p:blipFill>
         <p:spPr>
           <a:xfrm>
-            <a:off x="879697" y="2489496"/>
-            <a:ext cx="3670300" cy="1092200"/>
+            <a:off x="6188419" y="2562003"/>
+            <a:ext cx="5162827" cy="2945662"/>
           </a:xfrm>
           <a:prstGeom prst="rect">
             <a:avLst/>
@@ -8215,7 +8465,7 @@
           <a:p>
             <a:r>
               <a:rPr lang="en-GB" dirty="0"/>
-              <a:t>CSS Border-Radius</a:t>
+              <a:t>flex-direction</a:t>
             </a:r>
           </a:p>
         </p:txBody>
@@ -8249,56 +8499,75 @@
           <a:lstStyle/>
           <a:p>
             <a:r>
+              <a:rPr lang="en-GB" dirty="0"/>
+              <a:t>flex-direction:</a:t>
+            </a:r>
+            <a:br>
+              <a:rPr lang="en-GB" dirty="0"/>
+            </a:br>
+            <a:r>
+              <a:rPr lang="en-GB" dirty="0"/>
+              <a:t>defines the direction in which the flex items are placed in the flex container.</a:t>
+            </a:r>
+          </a:p>
+          <a:p>
+            <a:pPr>
+              <a:buFont typeface="Arial" panose="020B0604020202020204" pitchFamily="34" charset="0"/>
+              <a:buChar char="•"/>
+            </a:pPr>
+            <a:r>
+              <a:rPr lang="en-GB" dirty="0"/>
+              <a:t>row (default): Horizontal layout.</a:t>
+            </a:r>
+          </a:p>
+          <a:p>
+            <a:pPr>
+              <a:buFont typeface="Arial" panose="020B0604020202020204" pitchFamily="34" charset="0"/>
+              <a:buChar char="•"/>
+            </a:pPr>
+            <a:r>
+              <a:rPr lang="en-GB" dirty="0"/>
+              <a:t>column: Vertical layout.</a:t>
+            </a:r>
+          </a:p>
+          <a:p>
+            <a:pPr>
+              <a:buFont typeface="Arial" panose="020B0604020202020204" pitchFamily="34" charset="0"/>
+              <a:buChar char="•"/>
+            </a:pPr>
+            <a:r>
+              <a:rPr lang="en-GB" dirty="0"/>
+              <a:t>row-reverse: Reverses the order of items horizontally.</a:t>
+            </a:r>
+          </a:p>
+          <a:p>
+            <a:pPr>
+              <a:buFont typeface="Arial" panose="020B0604020202020204" pitchFamily="34" charset="0"/>
+              <a:buChar char="•"/>
+            </a:pPr>
+            <a:r>
+              <a:rPr lang="en-GB" dirty="0"/>
+              <a:t>column-reverse: Reverses the order of items vertically.</a:t>
+            </a:r>
+          </a:p>
+          <a:p>
+            <a:r>
               <a:rPr lang="en-GB" b="1" dirty="0"/>
-              <a:t>Border-radius</a:t>
-            </a:r>
-            <a:r>
-              <a:rPr lang="en-GB" dirty="0"/>
-              <a:t> rounds the corners of an element.</a:t>
-            </a:r>
-          </a:p>
-          <a:p>
-            <a:r>
-              <a:rPr lang="en-GB" dirty="0"/>
-              <a:t>Can be applied to individual corners (border-top-left-radius, etc.) or all corners.</a:t>
-            </a:r>
-          </a:p>
-          <a:p>
-            <a:r>
-              <a:rPr lang="en-GB" dirty="0"/>
-              <a:t>Syntax:</a:t>
-            </a:r>
-          </a:p>
-          <a:p>
+              <a:t>Example:</a:t>
+            </a:r>
             <a:endParaRPr lang="en-GB" dirty="0"/>
           </a:p>
           <a:p>
             <a:endParaRPr lang="en-GB" dirty="0"/>
-          </a:p>
-          <a:p>
-            <a:endParaRPr lang="en-GB" dirty="0"/>
-          </a:p>
-          <a:p>
-            <a:endParaRPr lang="en-GB" dirty="0"/>
-          </a:p>
-          <a:p>
-            <a:r>
-              <a:rPr lang="en-GB" b="1" dirty="0"/>
-              <a:t>Result:</a:t>
-            </a:r>
-            <a:r>
-              <a:rPr lang="en-GB" dirty="0"/>
-              <a:t> Rounded corners with a radius of 10px.</a:t>
-            </a:r>
           </a:p>
         </p:txBody>
       </p:sp>
       <p:pic>
         <p:nvPicPr>
-          <p:cNvPr id="6" name="Picture 5" descr="A black background with white and pink text&#10;&#10;Description automatically generated">
+          <p:cNvPr id="5" name="Picture 4" descr="A computer code on a black background&#10;&#10;Description automatically generated">
             <a:extLst>
               <a:ext uri="{FF2B5EF4-FFF2-40B4-BE49-F238E27FC236}">
-                <a16:creationId xmlns:a16="http://schemas.microsoft.com/office/drawing/2014/main" id="{783BF16F-5C8B-C17F-8272-C57668B5C885}"/>
+                <a16:creationId xmlns:a16="http://schemas.microsoft.com/office/drawing/2014/main" id="{51055000-A0AD-F154-E4C7-B56F5D2B0680}"/>
               </a:ext>
             </a:extLst>
           </p:cNvPr>
@@ -8315,8 +8584,8 @@
         </p:blipFill>
         <p:spPr>
           <a:xfrm>
-            <a:off x="945116" y="3942020"/>
-            <a:ext cx="4368800" cy="1143000"/>
+            <a:off x="6003583" y="2524347"/>
+            <a:ext cx="5786387" cy="2760034"/>
           </a:xfrm>
           <a:prstGeom prst="rect">
             <a:avLst/>
@@ -8389,7 +8658,7 @@
           <a:p>
             <a:r>
               <a:rPr lang="en-GB" dirty="0"/>
-              <a:t>CSS Border-Radius Examples</a:t>
+              <a:t>flex-wrap</a:t>
             </a:r>
           </a:p>
         </p:txBody>
@@ -8422,41 +8691,77 @@
           </a:bodyPr>
           <a:lstStyle/>
           <a:p>
-            <a:endParaRPr lang="en-GB" b="1" dirty="0"/>
-          </a:p>
-          <a:p>
-            <a:endParaRPr lang="en-GB" b="1" dirty="0"/>
-          </a:p>
-          <a:p>
-            <a:endParaRPr lang="en-GB" b="1" dirty="0"/>
-          </a:p>
-          <a:p>
-            <a:endParaRPr lang="en-GB" b="1" dirty="0"/>
-          </a:p>
-          <a:p>
+            <a:r>
+              <a:rPr lang="en-GB" dirty="0"/>
+              <a:t>By default, Flexbox tries to fit items on a single line. </a:t>
+            </a:r>
+            <a:br>
+              <a:rPr lang="en-GB" dirty="0"/>
+            </a:br>
+            <a:br>
+              <a:rPr lang="en-GB" dirty="0"/>
+            </a:br>
             <a:r>
               <a:rPr lang="en-GB" b="1" dirty="0"/>
-              <a:t>Result</a:t>
-            </a:r>
-            <a:r>
-              <a:rPr lang="en-GB" dirty="0"/>
-              <a:t>: A perfect circle if applied to a square element.</a:t>
-            </a:r>
-          </a:p>
-          <a:p>
-            <a:r>
-              <a:rPr lang="en-GB" dirty="0"/>
-              <a:t>Also possible to specify different radii for each corner (e.g., border-radius: 10px 20px 30px 40px;).</a:t>
+              <a:t>flex-wrap</a:t>
+            </a:r>
+            <a:r>
+              <a:rPr lang="en-GB" dirty="0"/>
+              <a:t> allows items to wrap onto multiple lines.</a:t>
+            </a:r>
+          </a:p>
+          <a:p>
+            <a:pPr>
+              <a:buFont typeface="Arial" panose="020B0604020202020204" pitchFamily="34" charset="0"/>
+              <a:buChar char="•"/>
+            </a:pPr>
+            <a:r>
+              <a:rPr lang="en-GB" dirty="0" err="1"/>
+              <a:t>nowrap</a:t>
+            </a:r>
+            <a:r>
+              <a:rPr lang="en-GB" dirty="0"/>
+              <a:t>: All items stay on one line.</a:t>
+            </a:r>
+          </a:p>
+          <a:p>
+            <a:pPr>
+              <a:buFont typeface="Arial" panose="020B0604020202020204" pitchFamily="34" charset="0"/>
+              <a:buChar char="•"/>
+            </a:pPr>
+            <a:r>
+              <a:rPr lang="en-GB" dirty="0"/>
+              <a:t>wrap: Items will wrap to the next line if they overflow.</a:t>
+            </a:r>
+          </a:p>
+          <a:p>
+            <a:pPr>
+              <a:buFont typeface="Arial" panose="020B0604020202020204" pitchFamily="34" charset="0"/>
+              <a:buChar char="•"/>
+            </a:pPr>
+            <a:r>
+              <a:rPr lang="en-GB" dirty="0"/>
+              <a:t>wrap-reverse: Items wrap in reverse order.</a:t>
+            </a:r>
+            <a:br>
+              <a:rPr lang="en-GB" dirty="0"/>
+            </a:br>
+            <a:br>
+              <a:rPr lang="en-GB" dirty="0"/>
+            </a:br>
+            <a:r>
+              <a:rPr lang="en-GB" dirty="0"/>
+              <a:t>Demo…</a:t>
             </a:r>
           </a:p>
         </p:txBody>
       </p:sp>
       <p:pic>
         <p:nvPicPr>
-          <p:cNvPr id="7" name="Picture 6" descr="A black background with white text&#10;&#10;Description automatically generated">
+          <p:cNvPr id="5" name="Picture 4" descr="A black screen with white text&#10;&#10;Description automatically generated">
             <a:extLst>
               <a:ext uri="{FF2B5EF4-FFF2-40B4-BE49-F238E27FC236}">
-                <a16:creationId xmlns:a16="http://schemas.microsoft.com/office/drawing/2014/main" id="{24946D0C-5272-0051-632E-17D705A64810}"/>
+                <a16:creationId xmlns:a16="http://schemas.microsoft.com/office/drawing/2014/main" id="{878956E6-AACB-0603-30C1-34B2D386D23E}"/>
               </a:ext>
             </a:extLst>
           </p:cNvPr>
@@ -8473,8 +8778,8 @@
         </p:blipFill>
         <p:spPr>
           <a:xfrm>
-            <a:off x="1412949" y="2447703"/>
-            <a:ext cx="3454400" cy="1409700"/>
+            <a:off x="6096000" y="2469116"/>
+            <a:ext cx="4932630" cy="3059813"/>
           </a:xfrm>
           <a:prstGeom prst="rect">
             <a:avLst/>
@@ -8547,7 +8852,7 @@
           <a:p>
             <a:r>
               <a:rPr lang="en-GB" dirty="0"/>
-              <a:t>CSS Box-Shadow</a:t>
+              <a:t>Flexbox Alignment</a:t>
             </a:r>
           </a:p>
         </p:txBody>
@@ -8576,26 +8881,18 @@
         </p:spPr>
         <p:txBody>
           <a:bodyPr anchor="ctr">
-            <a:normAutofit fontScale="92500"/>
+            <a:normAutofit/>
           </a:bodyPr>
           <a:lstStyle/>
           <a:p>
             <a:r>
-              <a:rPr lang="en-GB" dirty="0"/>
-              <a:t>Adds a shadow to an element, creating a 3D effect.</a:t>
-            </a:r>
-          </a:p>
-          <a:p>
-            <a:endParaRPr lang="en-GB" dirty="0"/>
-          </a:p>
-          <a:p>
-            <a:endParaRPr lang="en-GB" dirty="0"/>
-          </a:p>
-          <a:p>
-            <a:endParaRPr lang="en-GB" dirty="0"/>
-          </a:p>
-          <a:p>
-            <a:endParaRPr lang="en-GB" dirty="0"/>
+              <a:rPr lang="en-GB" b="1" dirty="0"/>
+              <a:t>justify-content</a:t>
+            </a:r>
+            <a:r>
+              <a:rPr lang="en-GB" dirty="0"/>
+              <a:t> aligns flex items along the main axis (horizontal if flex-direction: row, vertical if flex-direction: column).</a:t>
+            </a:r>
           </a:p>
           <a:p>
             <a:pPr>
@@ -8603,12 +8900,8 @@
               <a:buChar char="•"/>
             </a:pPr>
             <a:r>
-              <a:rPr lang="en-GB" b="1" dirty="0"/>
-              <a:t>Parameters</a:t>
-            </a:r>
-            <a:r>
-              <a:rPr lang="en-GB" dirty="0"/>
-              <a:t>: Horizontal offset (5px)</a:t>
+              <a:rPr lang="en-GB" dirty="0"/>
+              <a:t>flex-start: Align items to the start.</a:t>
             </a:r>
           </a:p>
           <a:p>
@@ -8617,8 +8910,20 @@
               <a:buChar char="•"/>
             </a:pPr>
             <a:r>
-              <a:rPr lang="en-GB" dirty="0"/>
-              <a:t>Vertical offset (5px)</a:t>
+              <a:rPr lang="en-GB" dirty="0" err="1"/>
+              <a:t>center</a:t>
+            </a:r>
+            <a:r>
+              <a:rPr lang="en-GB" dirty="0"/>
+              <a:t>: </a:t>
+            </a:r>
+            <a:r>
+              <a:rPr lang="en-GB" dirty="0" err="1"/>
+              <a:t>Center</a:t>
+            </a:r>
+            <a:r>
+              <a:rPr lang="en-GB" dirty="0"/>
+              <a:t> items.</a:t>
             </a:r>
           </a:p>
           <a:p>
@@ -8628,7 +8933,7 @@
             </a:pPr>
             <a:r>
               <a:rPr lang="en-GB" dirty="0"/>
-              <a:t>Blur radius (15px)</a:t>
+              <a:t>space-between: Distribute items with space between them.</a:t>
             </a:r>
           </a:p>
           <a:p>
@@ -8637,25 +8942,18 @@
               <a:buChar char="•"/>
             </a:pPr>
             <a:r>
-              <a:rPr lang="en-GB" dirty="0" err="1"/>
-              <a:t>Color</a:t>
-            </a:r>
-            <a:r>
-              <a:rPr lang="en-GB" dirty="0"/>
-              <a:t> (RGBA for transparency)</a:t>
-            </a:r>
-          </a:p>
-          <a:p>
-            <a:endParaRPr lang="en-GB" dirty="0"/>
+              <a:rPr lang="en-GB" dirty="0"/>
+              <a:t>space-around: Space around items, with even margins.</a:t>
+            </a:r>
           </a:p>
         </p:txBody>
       </p:sp>
       <p:pic>
         <p:nvPicPr>
-          <p:cNvPr id="6" name="Picture 5" descr="A black background with pink and orange letters&#10;&#10;Description automatically generated">
+          <p:cNvPr id="5" name="Picture 4" descr="A computer code on a black background&#10;&#10;Description automatically generated">
             <a:extLst>
               <a:ext uri="{FF2B5EF4-FFF2-40B4-BE49-F238E27FC236}">
-                <a16:creationId xmlns:a16="http://schemas.microsoft.com/office/drawing/2014/main" id="{0D0C4D70-B7B3-1AD7-0A20-9016F899A4CE}"/>
+                <a16:creationId xmlns:a16="http://schemas.microsoft.com/office/drawing/2014/main" id="{E0A72D29-B956-2E4E-DD4B-12ED4FE5EEFC}"/>
               </a:ext>
             </a:extLst>
           </p:cNvPr>
@@ -8672,8 +8970,8 @@
         </p:blipFill>
         <p:spPr>
           <a:xfrm>
-            <a:off x="1809160" y="2744825"/>
-            <a:ext cx="5575300" cy="1155700"/>
+            <a:off x="6003583" y="2594773"/>
+            <a:ext cx="5806155" cy="2715782"/>
           </a:xfrm>
           <a:prstGeom prst="rect">
             <a:avLst/>

</xml_diff>